<commit_message>
Final project submission: Added notebook, presentation, and final README
</commit_message>
<xml_diff>
--- a/Slides-Deck/Preventive_Health_Copilot.pptx
+++ b/Slides-Deck/Preventive_Health_Copilot.pptx
@@ -1320,8 +1320,8 @@
         </p:nvSpPr>
         <p:spPr>
           <a:xfrm>
-            <a:off x="1143225" y="685800"/>
-            <a:ext cx="4572300" cy="3429000"/>
+            <a:off x="381000" y="685800"/>
+            <a:ext cx="6096000" cy="3429000"/>
           </a:xfrm>
           <a:custGeom>
             <a:avLst/>
@@ -13397,7 +13397,7 @@
               <a:t>ReAct</a:t>
             </a:r>
             <a:r>
-              <a:rPr lang="en-US" sz="1650" b="0" i="0" u="none" strike="noStrike" cap="none">
+              <a:rPr lang="en-US" sz="1650" b="0" i="0" u="none" strike="noStrike" cap="none" dirty="0">
                 <a:solidFill>
                   <a:srgbClr val="334155"/>
                 </a:solidFill>
@@ -13408,7 +13408,7 @@
               </a:rPr>
               <a:t> (Reason-Act) agent.</a:t>
             </a:r>
-            <a:endParaRPr/>
+            <a:endParaRPr dirty="0"/>
           </a:p>
         </p:txBody>
       </p:sp>
@@ -13421,7 +13421,7 @@
         <p:spPr>
           <a:xfrm>
             <a:off x="2286000" y="3929062"/>
-            <a:ext cx="8096250" cy="670321"/>
+            <a:ext cx="8096250" cy="812530"/>
           </a:xfrm>
           <a:prstGeom prst="rect">
             <a:avLst/>
@@ -13450,7 +13450,7 @@
               <a:buNone/>
             </a:pPr>
             <a:r>
-              <a:rPr lang="en-US" sz="1650" b="1" i="0" u="none" strike="noStrike" cap="none">
+              <a:rPr lang="en-US" sz="1650" b="1" i="0" u="none" strike="noStrike" cap="none" dirty="0">
                 <a:solidFill>
                   <a:srgbClr val="1E3A8A"/>
                 </a:solidFill>
@@ -13462,7 +13462,7 @@
               <a:t>Tools:</a:t>
             </a:r>
             <a:r>
-              <a:rPr lang="en-US" sz="1650" b="0" i="0" u="none" strike="noStrike" cap="none">
+              <a:rPr lang="en-US" sz="1650" b="0" i="0" u="none" strike="noStrike" cap="none" dirty="0">
                 <a:solidFill>
                   <a:srgbClr val="334155"/>
                 </a:solidFill>
@@ -13471,9 +13471,81 @@
                 <a:cs typeface="Lato"/>
                 <a:sym typeface="Lato"/>
               </a:rPr>
-              <a:t> Standard Python functions (`get_health_tips`, `schedule_preventive_reminder`) integrated as agent tools.</a:t>
+              <a:t> Standard Python functions (‘</a:t>
             </a:r>
-            <a:endParaRPr/>
+            <a:r>
+              <a:rPr lang="en-US" sz="1650" b="0" i="0" u="none" strike="noStrike" cap="none" dirty="0" err="1">
+                <a:solidFill>
+                  <a:srgbClr val="334155"/>
+                </a:solidFill>
+                <a:latin typeface="Lato"/>
+                <a:ea typeface="Lato"/>
+                <a:cs typeface="Lato"/>
+                <a:sym typeface="Lato"/>
+              </a:rPr>
+              <a:t>get_health_tips</a:t>
+            </a:r>
+            <a:r>
+              <a:rPr lang="en-US" sz="1650" b="0" i="0" u="none" strike="noStrike" cap="none" dirty="0">
+                <a:solidFill>
+                  <a:srgbClr val="334155"/>
+                </a:solidFill>
+                <a:latin typeface="Lato"/>
+                <a:ea typeface="Lato"/>
+                <a:cs typeface="Lato"/>
+                <a:sym typeface="Lato"/>
+              </a:rPr>
+              <a:t>’, </a:t>
+            </a:r>
+            <a:r>
+              <a:rPr lang="en-US" sz="1650" dirty="0">
+                <a:solidFill>
+                  <a:srgbClr val="334155"/>
+                </a:solidFill>
+                <a:latin typeface="Lato"/>
+                <a:ea typeface="Lato"/>
+                <a:cs typeface="Lato"/>
+                <a:sym typeface="Lato"/>
+              </a:rPr>
+              <a:t>‘</a:t>
+            </a:r>
+            <a:r>
+              <a:rPr lang="en-US" sz="1650" b="0" i="0" u="none" strike="noStrike" cap="none" dirty="0" err="1">
+                <a:solidFill>
+                  <a:srgbClr val="334155"/>
+                </a:solidFill>
+                <a:latin typeface="Lato"/>
+                <a:ea typeface="Lato"/>
+                <a:cs typeface="Lato"/>
+                <a:sym typeface="Lato"/>
+              </a:rPr>
+              <a:t>schedule_preventive_reminder</a:t>
+            </a:r>
+            <a:r>
+              <a:rPr lang="en-US" sz="1650" dirty="0">
+                <a:solidFill>
+                  <a:srgbClr val="334155"/>
+                </a:solidFill>
+                <a:latin typeface="Lato"/>
+                <a:ea typeface="Lato"/>
+                <a:cs typeface="Lato"/>
+                <a:sym typeface="Lato"/>
+              </a:rPr>
+              <a:t>’</a:t>
+            </a:r>
+            <a:r>
+              <a:rPr lang="en-US" sz="1650" b="0" i="0" u="none" strike="noStrike" cap="none" dirty="0">
+                <a:solidFill>
+                  <a:srgbClr val="334155"/>
+                </a:solidFill>
+                <a:latin typeface="Lato"/>
+                <a:ea typeface="Lato"/>
+                <a:cs typeface="Lato"/>
+                <a:sym typeface="Lato"/>
+              </a:rPr>
+              <a:t>) integrated as agent tools.</a:t>
+            </a:r>
+            <a:endParaRPr dirty="0"/>
           </a:p>
         </p:txBody>
       </p:sp>
@@ -13801,7 +13873,7 @@
         <p:spPr>
           <a:xfrm>
             <a:off x="962025" y="2790012"/>
-            <a:ext cx="4670700" cy="369300"/>
+            <a:ext cx="4670700" cy="353943"/>
           </a:xfrm>
           <a:prstGeom prst="rect">
             <a:avLst/>
@@ -13827,7 +13899,7 @@
               <a:buNone/>
             </a:pPr>
             <a:r>
-              <a:rPr lang="en-US" sz="2400" b="1" i="0" u="none" strike="noStrike" cap="none">
+              <a:rPr lang="en-US" sz="2300" b="1" i="0" u="none" strike="noStrike" cap="none" dirty="0" err="1">
                 <a:solidFill>
                   <a:srgbClr val="005088"/>
                 </a:solidFill>
@@ -13838,7 +13910,7 @@
               </a:rPr>
               <a:t>get_health_tips</a:t>
             </a:r>
-            <a:endParaRPr/>
+            <a:endParaRPr sz="2300" dirty="0"/>
           </a:p>
         </p:txBody>
       </p:sp>
@@ -13909,7 +13981,7 @@
         <p:spPr>
           <a:xfrm>
             <a:off x="6667500" y="2790000"/>
-            <a:ext cx="5055900" cy="369300"/>
+            <a:ext cx="5055900" cy="353943"/>
           </a:xfrm>
           <a:prstGeom prst="rect">
             <a:avLst/>
@@ -13935,7 +14007,7 @@
               <a:buNone/>
             </a:pPr>
             <a:r>
-              <a:rPr lang="en-US" sz="2400" b="1" i="0" u="none" strike="noStrike" cap="none">
+              <a:rPr lang="en-US" sz="2300" b="1" i="0" u="none" strike="noStrike" cap="none" dirty="0" err="1">
                 <a:solidFill>
                   <a:srgbClr val="005088"/>
                 </a:solidFill>
@@ -13946,7 +14018,7 @@
               </a:rPr>
               <a:t>schedule_preventive_reminder</a:t>
             </a:r>
-            <a:endParaRPr/>
+            <a:endParaRPr sz="2300" dirty="0"/>
           </a:p>
         </p:txBody>
       </p:sp>

</xml_diff>